<commit_message>
Return to old slide arrangement
</commit_message>
<xml_diff>
--- a/Courses/Software-Sciences/Module-4-Information-Systems-New/08-Navigation-between-Tables/08-Navigation-between-Tables.pptx
+++ b/Courses/Software-Sciences/Module-4-Information-Systems-New/08-Navigation-between-Tables/08-Navigation-between-Tables.pptx
@@ -340,7 +340,7 @@
           <a:p>
             <a:fld id="{4E087215-0C8F-4762-A664-737A353EC9A4}" type="datetimeFigureOut">
               <a:rPr lang="bg-BG" smtClean="0"/>
-              <a:t>3.10.24 г.</a:t>
+              <a:t>6.10.2024 г.</a:t>
             </a:fld>
             <a:endParaRPr lang="bg-BG"/>
           </a:p>
@@ -536,7 +536,7 @@
           <a:p>
             <a:fld id="{72D84649-876A-46C9-8472-14CB09C070D8}" type="datetimeFigureOut">
               <a:rPr lang="en-US" smtClean="0"/>
-              <a:t>10/3/24</a:t>
+              <a:t>10/6/2024</a:t>
             </a:fld>
             <a:endParaRPr lang="en-US"/>
           </a:p>
@@ -10182,8 +10182,8 @@
         </p:nvSpPr>
         <p:spPr bwMode="auto">
           <a:xfrm>
-            <a:off x="286863" y="1717770"/>
-            <a:ext cx="11125200" cy="4465426"/>
+            <a:off x="246000" y="1403355"/>
+            <a:ext cx="11125200" cy="5265645"/>
           </a:xfrm>
           <a:prstGeom prst="rect">
             <a:avLst/>
@@ -10360,7 +10360,31 @@
               <a:rPr lang="en-US" sz="1600" b="1" dirty="0">
                 <a:latin typeface="Consolas" panose="020B0609020204030204" pitchFamily="49" charset="0"/>
               </a:rPr>
-              <a:t>return;</a:t>
+              <a:t>return</a:t>
+            </a:r>
+            <a:r>
+              <a:rPr lang="en-US" sz="1600" b="1" dirty="0" smtClean="0">
+                <a:latin typeface="Consolas" panose="020B0609020204030204" pitchFamily="49" charset="0"/>
+              </a:rPr>
+              <a:t>;  </a:t>
+            </a:r>
+            <a:r>
+              <a:rPr lang="en-US" sz="1600" b="1" dirty="0" smtClean="0">
+                <a:solidFill>
+                  <a:schemeClr val="accent2"/>
+                </a:solidFill>
+                <a:latin typeface="Consolas" panose="020B0609020204030204" pitchFamily="49" charset="0"/>
+              </a:rPr>
+              <a:t>// </a:t>
+            </a:r>
+            <a:r>
+              <a:rPr lang="bg-BG" sz="1600" b="1" dirty="0">
+                <a:solidFill>
+                  <a:schemeClr val="accent2"/>
+                </a:solidFill>
+                <a:latin typeface="Consolas" panose="020B0609020204030204" pitchFamily="49" charset="0"/>
+              </a:rPr>
+              <a:t>Няма избрана държава</a:t>
             </a:r>
             <a:endParaRPr lang="en-US" sz="1600" b="1" dirty="0">
               <a:solidFill>
@@ -10451,8 +10475,64 @@
               <a:rPr lang="en-US" sz="1600" b="1" dirty="0">
                 <a:latin typeface="Consolas" panose="020B0609020204030204" pitchFamily="49" charset="0"/>
               </a:rPr>
-              <a:t>    {</a:t>
-            </a:r>
+              <a:t>    </a:t>
+            </a:r>
+            <a:r>
+              <a:rPr lang="en-US" sz="1600" b="1" dirty="0" smtClean="0">
+                <a:latin typeface="Consolas" panose="020B0609020204030204" pitchFamily="49" charset="0"/>
+              </a:rPr>
+              <a:t>{</a:t>
+            </a:r>
+          </a:p>
+          <a:p>
+            <a:pPr>
+              <a:spcBef>
+                <a:spcPts val="600"/>
+              </a:spcBef>
+              <a:spcAft>
+                <a:spcPts val="600"/>
+              </a:spcAft>
+              <a:buClr>
+                <a:srgbClr val="F2B254"/>
+              </a:buClr>
+              <a:buSzPct val="100000"/>
+            </a:pPr>
+            <a:r>
+              <a:rPr lang="en-US" sz="1600" b="1" dirty="0">
+                <a:latin typeface="Consolas" panose="020B0609020204030204" pitchFamily="49" charset="0"/>
+              </a:rPr>
+              <a:t>	</a:t>
+            </a:r>
+            <a:r>
+              <a:rPr lang="en-US" sz="1600" b="1" dirty="0">
+                <a:solidFill>
+                  <a:schemeClr val="accent2"/>
+                </a:solidFill>
+                <a:latin typeface="Consolas" panose="020B0609020204030204" pitchFamily="49" charset="0"/>
+              </a:rPr>
+              <a:t>// </a:t>
+            </a:r>
+            <a:r>
+              <a:rPr lang="bg-BG" sz="1600" b="1" dirty="0">
+                <a:solidFill>
+                  <a:schemeClr val="accent2"/>
+                </a:solidFill>
+                <a:latin typeface="Consolas" panose="020B0609020204030204" pitchFamily="49" charset="0"/>
+              </a:rPr>
+              <a:t>Извличане на градовете, които принадлежат на избраната </a:t>
+            </a:r>
+            <a:r>
+              <a:rPr lang="bg-BG" sz="1600" b="1" dirty="0" smtClean="0">
+                <a:solidFill>
+                  <a:schemeClr val="accent2"/>
+                </a:solidFill>
+                <a:latin typeface="Consolas" panose="020B0609020204030204" pitchFamily="49" charset="0"/>
+              </a:rPr>
+              <a:t>държава</a:t>
+            </a:r>
+            <a:endParaRPr lang="en-US" sz="1600" b="1" dirty="0">
+              <a:latin typeface="Consolas" panose="020B0609020204030204" pitchFamily="49" charset="0"/>
+            </a:endParaRPr>
           </a:p>
           <a:p>
             <a:pPr>
@@ -10524,7 +10604,83 @@
               <a:rPr lang="en-US" sz="1600" b="1" dirty="0">
                 <a:latin typeface="Consolas" panose="020B0609020204030204" pitchFamily="49" charset="0"/>
               </a:rPr>
-              <a:t>).ToList();</a:t>
+              <a:t>).</a:t>
+            </a:r>
+            <a:r>
+              <a:rPr lang="en-US" sz="1600" b="1" dirty="0" err="1">
+                <a:latin typeface="Consolas" panose="020B0609020204030204" pitchFamily="49" charset="0"/>
+              </a:rPr>
+              <a:t>ToList</a:t>
+            </a:r>
+            <a:r>
+              <a:rPr lang="en-US" sz="1600" b="1" dirty="0" smtClean="0">
+                <a:latin typeface="Consolas" panose="020B0609020204030204" pitchFamily="49" charset="0"/>
+              </a:rPr>
+              <a:t>();</a:t>
+            </a:r>
+          </a:p>
+          <a:p>
+            <a:pPr lvl="1">
+              <a:spcBef>
+                <a:spcPts val="600"/>
+              </a:spcBef>
+              <a:spcAft>
+                <a:spcPts val="600"/>
+              </a:spcAft>
+              <a:buClr>
+                <a:srgbClr val="F2B254"/>
+              </a:buClr>
+              <a:buSzPct val="100000"/>
+              <a:buFont typeface="Wingdings" panose="05000000000000000000" pitchFamily="2" charset="2"/>
+              <a:buNone/>
+            </a:pPr>
+            <a:r>
+              <a:rPr lang="en-US" sz="1600" b="1" dirty="0">
+                <a:latin typeface="Consolas" panose="020B0609020204030204" pitchFamily="49" charset="0"/>
+              </a:rPr>
+              <a:t> </a:t>
+            </a:r>
+            <a:r>
+              <a:rPr lang="en-US" sz="1600" b="1" dirty="0" smtClean="0">
+                <a:latin typeface="Consolas" panose="020B0609020204030204" pitchFamily="49" charset="0"/>
+              </a:rPr>
+              <a:t>	</a:t>
+            </a:r>
+            <a:r>
+              <a:rPr lang="en-US" sz="1600" b="1" dirty="0" smtClean="0">
+                <a:solidFill>
+                  <a:schemeClr val="accent2"/>
+                </a:solidFill>
+                <a:latin typeface="Consolas" panose="020B0609020204030204" pitchFamily="49" charset="0"/>
+              </a:rPr>
+              <a:t>// </a:t>
+            </a:r>
+            <a:r>
+              <a:rPr lang="bg-BG" sz="1600" b="1" dirty="0">
+                <a:solidFill>
+                  <a:schemeClr val="accent2"/>
+                </a:solidFill>
+                <a:latin typeface="Consolas" panose="020B0609020204030204" pitchFamily="49" charset="0"/>
+              </a:rPr>
+              <a:t>Обновяване на </a:t>
+            </a:r>
+            <a:r>
+              <a:rPr lang="en-US" sz="1600" b="1" dirty="0">
+                <a:solidFill>
+                  <a:schemeClr val="accent2"/>
+                </a:solidFill>
+                <a:latin typeface="Consolas" panose="020B0609020204030204" pitchFamily="49" charset="0"/>
+              </a:rPr>
+              <a:t>DataGridView </a:t>
+            </a:r>
+            <a:r>
+              <a:rPr lang="bg-BG" sz="1600" b="1" dirty="0">
+                <a:solidFill>
+                  <a:schemeClr val="accent2"/>
+                </a:solidFill>
+                <a:latin typeface="Consolas" panose="020B0609020204030204" pitchFamily="49" charset="0"/>
+              </a:rPr>
+              <a:t>за градовете</a:t>
             </a:r>
             <a:endParaRPr lang="bg-BG" sz="1600" b="1" dirty="0">
               <a:solidFill>
@@ -10683,8 +10839,8 @@
         </p:blipFill>
         <p:spPr>
           <a:xfrm>
-            <a:off x="8168960" y="2086434"/>
-            <a:ext cx="3788454" cy="2411483"/>
+            <a:off x="8222143" y="1989000"/>
+            <a:ext cx="3532710" cy="2248693"/>
           </a:xfrm>
           <a:prstGeom prst="rect">
             <a:avLst/>
@@ -10701,417 +10857,6 @@
           </a:effectLst>
         </p:spPr>
       </p:pic>
-      <p:sp>
-        <p:nvSpPr>
-          <p:cNvPr id="3" name="Rounded Rectangular Callout 2">
-            <a:extLst>
-              <a:ext uri="{FF2B5EF4-FFF2-40B4-BE49-F238E27FC236}">
-                <a16:creationId xmlns:a16="http://schemas.microsoft.com/office/drawing/2014/main" id="{4B038954-45B2-F653-9C8A-9DDC1C1A3F0D}"/>
-              </a:ext>
-            </a:extLst>
-          </p:cNvPr>
-          <p:cNvSpPr/>
-          <p:nvPr/>
-        </p:nvSpPr>
-        <p:spPr bwMode="auto">
-          <a:xfrm>
-            <a:off x="5146433" y="2214000"/>
-            <a:ext cx="2835000" cy="453541"/>
-          </a:xfrm>
-          <a:prstGeom prst="wedgeRoundRectCallout">
-            <a:avLst>
-              <a:gd name="adj1" fmla="val -58993"/>
-              <a:gd name="adj2" fmla="val 154982"/>
-              <a:gd name="adj3" fmla="val 16667"/>
-            </a:avLst>
-          </a:prstGeom>
-          <a:solidFill>
-            <a:schemeClr val="dk2">
-              <a:alpha val="80000"/>
-            </a:schemeClr>
-          </a:solidFill>
-          <a:ln w="19050">
-            <a:solidFill>
-              <a:schemeClr val="tx1">
-                <a:lumMod val="75000"/>
-                <a:alpha val="80000"/>
-              </a:schemeClr>
-            </a:solidFill>
-          </a:ln>
-          <a:effectLst/>
-        </p:spPr>
-        <p:style>
-          <a:lnRef idx="2">
-            <a:schemeClr val="accent1">
-              <a:shade val="50000"/>
-            </a:schemeClr>
-          </a:lnRef>
-          <a:fillRef idx="1001">
-            <a:schemeClr val="dk2"/>
-          </a:fillRef>
-          <a:effectRef idx="0">
-            <a:schemeClr val="accent1"/>
-          </a:effectRef>
-          <a:fontRef idx="minor">
-            <a:schemeClr val="lt1"/>
-          </a:fontRef>
-        </p:style>
-        <p:txBody>
-          <a:bodyPr rot="0" spcFirstLastPara="0" vertOverflow="overflow" horzOverflow="overflow" vert="horz" wrap="square" lIns="91440" tIns="45720" rIns="91440" bIns="45720" numCol="1" spcCol="0" rtlCol="0" fromWordArt="0" anchor="ctr" anchorCtr="0" forceAA="0" compatLnSpc="1">
-            <a:prstTxWarp prst="textNoShape">
-              <a:avLst/>
-            </a:prstTxWarp>
-            <a:noAutofit/>
-          </a:bodyPr>
-          <a:lstStyle/>
-          <a:p>
-            <a:pPr algn="ctr"/>
-            <a:r>
-              <a:rPr lang="bg-BG" sz="2000" b="1" dirty="0">
-                <a:solidFill>
-                  <a:schemeClr val="bg2"/>
-                </a:solidFill>
-                <a:effectLst>
-                  <a:outerShdw blurRad="38100" dist="38100" dir="2700000" algn="tl">
-                    <a:srgbClr val="000000">
-                      <a:alpha val="43137"/>
-                    </a:srgbClr>
-                  </a:outerShdw>
-                </a:effectLst>
-              </a:rPr>
-              <a:t>Няма избрана </a:t>
-            </a:r>
-            <a:r>
-              <a:rPr lang="bg-BG" sz="2000" b="1" dirty="0">
-                <a:solidFill>
-                  <a:schemeClr val="accent1">
-                    <a:lumMod val="60000"/>
-                    <a:lumOff val="40000"/>
-                  </a:schemeClr>
-                </a:solidFill>
-                <a:effectLst>
-                  <a:outerShdw blurRad="38100" dist="38100" dir="2700000" algn="tl">
-                    <a:srgbClr val="000000">
-                      <a:alpha val="43137"/>
-                    </a:srgbClr>
-                  </a:outerShdw>
-                </a:effectLst>
-              </a:rPr>
-              <a:t>държава</a:t>
-            </a:r>
-            <a:endParaRPr lang="en-BG" sz="2000" b="1" dirty="0">
-              <a:solidFill>
-                <a:schemeClr val="accent1">
-                  <a:lumMod val="60000"/>
-                  <a:lumOff val="40000"/>
-                </a:schemeClr>
-              </a:solidFill>
-              <a:effectLst>
-                <a:outerShdw blurRad="38100" dist="38100" dir="2700000" algn="tl">
-                  <a:srgbClr val="000000">
-                    <a:alpha val="43137"/>
-                  </a:srgbClr>
-                </a:outerShdw>
-              </a:effectLst>
-            </a:endParaRPr>
-          </a:p>
-        </p:txBody>
-      </p:sp>
-      <p:sp>
-        <p:nvSpPr>
-          <p:cNvPr id="5" name="Rounded Rectangular Callout 4">
-            <a:extLst>
-              <a:ext uri="{FF2B5EF4-FFF2-40B4-BE49-F238E27FC236}">
-                <a16:creationId xmlns:a16="http://schemas.microsoft.com/office/drawing/2014/main" id="{261F2B0E-F35C-5926-FD0C-E513D218DDEC}"/>
-              </a:ext>
-            </a:extLst>
-          </p:cNvPr>
-          <p:cNvSpPr/>
-          <p:nvPr/>
-        </p:nvSpPr>
-        <p:spPr bwMode="auto">
-          <a:xfrm>
-            <a:off x="1596000" y="3312281"/>
-            <a:ext cx="3532500" cy="990704"/>
-          </a:xfrm>
-          <a:prstGeom prst="wedgeRoundRectCallout">
-            <a:avLst>
-              <a:gd name="adj1" fmla="val 32167"/>
-              <a:gd name="adj2" fmla="val 77484"/>
-              <a:gd name="adj3" fmla="val 16667"/>
-            </a:avLst>
-          </a:prstGeom>
-          <a:solidFill>
-            <a:schemeClr val="dk2">
-              <a:alpha val="80000"/>
-            </a:schemeClr>
-          </a:solidFill>
-          <a:ln w="19050">
-            <a:solidFill>
-              <a:schemeClr val="tx1">
-                <a:lumMod val="75000"/>
-                <a:alpha val="80000"/>
-              </a:schemeClr>
-            </a:solidFill>
-          </a:ln>
-          <a:effectLst/>
-        </p:spPr>
-        <p:style>
-          <a:lnRef idx="2">
-            <a:schemeClr val="accent1">
-              <a:shade val="50000"/>
-            </a:schemeClr>
-          </a:lnRef>
-          <a:fillRef idx="1001">
-            <a:schemeClr val="dk2"/>
-          </a:fillRef>
-          <a:effectRef idx="0">
-            <a:schemeClr val="accent1"/>
-          </a:effectRef>
-          <a:fontRef idx="minor">
-            <a:schemeClr val="lt1"/>
-          </a:fontRef>
-        </p:style>
-        <p:txBody>
-          <a:bodyPr rot="0" spcFirstLastPara="0" vertOverflow="overflow" horzOverflow="overflow" vert="horz" wrap="square" lIns="91440" tIns="45720" rIns="91440" bIns="45720" numCol="1" spcCol="0" rtlCol="0" fromWordArt="0" anchor="ctr" anchorCtr="0" forceAA="0" compatLnSpc="1">
-            <a:prstTxWarp prst="textNoShape">
-              <a:avLst/>
-            </a:prstTxWarp>
-            <a:noAutofit/>
-          </a:bodyPr>
-          <a:lstStyle/>
-          <a:p>
-            <a:pPr algn="ctr"/>
-            <a:r>
-              <a:rPr lang="bg-BG" sz="2000" b="1" dirty="0">
-                <a:solidFill>
-                  <a:schemeClr val="bg2"/>
-                </a:solidFill>
-                <a:latin typeface="Calibri" panose="020F0502020204030204" pitchFamily="34" charset="0"/>
-                <a:cs typeface="Calibri" panose="020F0502020204030204" pitchFamily="34" charset="0"/>
-              </a:rPr>
-              <a:t>Извличане на </a:t>
-            </a:r>
-            <a:r>
-              <a:rPr lang="bg-BG" sz="2000" b="1" dirty="0">
-                <a:solidFill>
-                  <a:schemeClr val="accent1">
-                    <a:lumMod val="60000"/>
-                    <a:lumOff val="40000"/>
-                  </a:schemeClr>
-                </a:solidFill>
-                <a:latin typeface="Calibri" panose="020F0502020204030204" pitchFamily="34" charset="0"/>
-                <a:cs typeface="Calibri" panose="020F0502020204030204" pitchFamily="34" charset="0"/>
-              </a:rPr>
-              <a:t>градовете</a:t>
-            </a:r>
-            <a:r>
-              <a:rPr lang="bg-BG" sz="2000" b="1" dirty="0">
-                <a:solidFill>
-                  <a:schemeClr val="bg2"/>
-                </a:solidFill>
-                <a:latin typeface="Calibri" panose="020F0502020204030204" pitchFamily="34" charset="0"/>
-                <a:cs typeface="Calibri" panose="020F0502020204030204" pitchFamily="34" charset="0"/>
-              </a:rPr>
-              <a:t>, които принадлежат на </a:t>
-            </a:r>
-            <a:r>
-              <a:rPr lang="bg-BG" sz="2000" b="1" dirty="0">
-                <a:solidFill>
-                  <a:schemeClr val="accent1">
-                    <a:lumMod val="60000"/>
-                    <a:lumOff val="40000"/>
-                  </a:schemeClr>
-                </a:solidFill>
-                <a:latin typeface="Calibri" panose="020F0502020204030204" pitchFamily="34" charset="0"/>
-                <a:cs typeface="Calibri" panose="020F0502020204030204" pitchFamily="34" charset="0"/>
-              </a:rPr>
-              <a:t>избраната</a:t>
-            </a:r>
-            <a:r>
-              <a:rPr lang="bg-BG" sz="2000" b="1" dirty="0">
-                <a:solidFill>
-                  <a:schemeClr val="bg2"/>
-                </a:solidFill>
-                <a:latin typeface="Calibri" panose="020F0502020204030204" pitchFamily="34" charset="0"/>
-                <a:cs typeface="Calibri" panose="020F0502020204030204" pitchFamily="34" charset="0"/>
-              </a:rPr>
-              <a:t> </a:t>
-            </a:r>
-            <a:r>
-              <a:rPr lang="bg-BG" sz="2000" b="1" dirty="0">
-                <a:solidFill>
-                  <a:schemeClr val="accent1">
-                    <a:lumMod val="60000"/>
-                    <a:lumOff val="40000"/>
-                  </a:schemeClr>
-                </a:solidFill>
-                <a:latin typeface="Calibri" panose="020F0502020204030204" pitchFamily="34" charset="0"/>
-                <a:cs typeface="Calibri" panose="020F0502020204030204" pitchFamily="34" charset="0"/>
-              </a:rPr>
-              <a:t>държава</a:t>
-            </a:r>
-            <a:endParaRPr lang="en-BG" sz="2000" b="1" dirty="0">
-              <a:solidFill>
-                <a:schemeClr val="accent1">
-                  <a:lumMod val="60000"/>
-                  <a:lumOff val="40000"/>
-                </a:schemeClr>
-              </a:solidFill>
-              <a:effectLst>
-                <a:outerShdw blurRad="38100" dist="38100" dir="2700000" algn="tl">
-                  <a:srgbClr val="000000">
-                    <a:alpha val="43137"/>
-                  </a:srgbClr>
-                </a:outerShdw>
-              </a:effectLst>
-              <a:latin typeface="Calibri" panose="020F0502020204030204" pitchFamily="34" charset="0"/>
-              <a:cs typeface="Calibri" panose="020F0502020204030204" pitchFamily="34" charset="0"/>
-            </a:endParaRPr>
-          </a:p>
-        </p:txBody>
-      </p:sp>
-      <p:sp>
-        <p:nvSpPr>
-          <p:cNvPr id="7" name="Rounded Rectangular Callout 6">
-            <a:extLst>
-              <a:ext uri="{FF2B5EF4-FFF2-40B4-BE49-F238E27FC236}">
-                <a16:creationId xmlns:a16="http://schemas.microsoft.com/office/drawing/2014/main" id="{3BE97E35-2420-71B0-8CC2-0049176277D2}"/>
-              </a:ext>
-            </a:extLst>
-          </p:cNvPr>
-          <p:cNvSpPr/>
-          <p:nvPr/>
-        </p:nvSpPr>
-        <p:spPr bwMode="auto">
-          <a:xfrm>
-            <a:off x="1793202" y="5541918"/>
-            <a:ext cx="3532501" cy="711156"/>
-          </a:xfrm>
-          <a:prstGeom prst="wedgeRoundRectCallout">
-            <a:avLst>
-              <a:gd name="adj1" fmla="val 28848"/>
-              <a:gd name="adj2" fmla="val -92912"/>
-              <a:gd name="adj3" fmla="val 16667"/>
-            </a:avLst>
-          </a:prstGeom>
-          <a:solidFill>
-            <a:schemeClr val="dk2">
-              <a:alpha val="80000"/>
-            </a:schemeClr>
-          </a:solidFill>
-          <a:ln w="19050">
-            <a:solidFill>
-              <a:schemeClr val="tx1">
-                <a:lumMod val="75000"/>
-                <a:alpha val="80000"/>
-              </a:schemeClr>
-            </a:solidFill>
-          </a:ln>
-          <a:effectLst/>
-        </p:spPr>
-        <p:style>
-          <a:lnRef idx="2">
-            <a:schemeClr val="accent1">
-              <a:shade val="50000"/>
-            </a:schemeClr>
-          </a:lnRef>
-          <a:fillRef idx="1001">
-            <a:schemeClr val="dk2"/>
-          </a:fillRef>
-          <a:effectRef idx="0">
-            <a:schemeClr val="accent1"/>
-          </a:effectRef>
-          <a:fontRef idx="minor">
-            <a:schemeClr val="lt1"/>
-          </a:fontRef>
-        </p:style>
-        <p:txBody>
-          <a:bodyPr rot="0" spcFirstLastPara="0" vertOverflow="overflow" horzOverflow="overflow" vert="horz" wrap="square" lIns="91440" tIns="45720" rIns="91440" bIns="45720" numCol="1" spcCol="0" rtlCol="0" fromWordArt="0" anchor="ctr" anchorCtr="0" forceAA="0" compatLnSpc="1">
-            <a:prstTxWarp prst="textNoShape">
-              <a:avLst/>
-            </a:prstTxWarp>
-            <a:noAutofit/>
-          </a:bodyPr>
-          <a:lstStyle/>
-          <a:p>
-            <a:pPr algn="ctr"/>
-            <a:r>
-              <a:rPr lang="bg-BG" sz="2000" b="1" dirty="0">
-                <a:solidFill>
-                  <a:schemeClr val="bg2"/>
-                </a:solidFill>
-                <a:latin typeface="Calibri" panose="020F0502020204030204" pitchFamily="34" charset="0"/>
-                <a:cs typeface="Calibri" panose="020F0502020204030204" pitchFamily="34" charset="0"/>
-              </a:rPr>
-              <a:t>Обновяване на </a:t>
-            </a:r>
-            <a:r>
-              <a:rPr lang="en-US" sz="2000" b="1" dirty="0">
-                <a:solidFill>
-                  <a:schemeClr val="accent1">
-                    <a:lumMod val="60000"/>
-                    <a:lumOff val="40000"/>
-                  </a:schemeClr>
-                </a:solidFill>
-                <a:latin typeface="Consolas" panose="020B0609020204030204" pitchFamily="49" charset="0"/>
-                <a:cs typeface="Consolas" panose="020B0609020204030204" pitchFamily="49" charset="0"/>
-              </a:rPr>
-              <a:t>DataGridView</a:t>
-            </a:r>
-            <a:r>
-              <a:rPr lang="en-US" sz="2000" b="1" dirty="0">
-                <a:solidFill>
-                  <a:schemeClr val="bg2"/>
-                </a:solidFill>
-                <a:latin typeface="Calibri" panose="020F0502020204030204" pitchFamily="34" charset="0"/>
-                <a:cs typeface="Calibri" panose="020F0502020204030204" pitchFamily="34" charset="0"/>
-              </a:rPr>
-              <a:t> </a:t>
-            </a:r>
-            <a:r>
-              <a:rPr lang="bg-BG" sz="2000" b="1" dirty="0">
-                <a:solidFill>
-                  <a:schemeClr val="bg2"/>
-                </a:solidFill>
-                <a:latin typeface="Calibri" panose="020F0502020204030204" pitchFamily="34" charset="0"/>
-                <a:cs typeface="Calibri" panose="020F0502020204030204" pitchFamily="34" charset="0"/>
-              </a:rPr>
-              <a:t>за </a:t>
-            </a:r>
-            <a:r>
-              <a:rPr lang="bg-BG" sz="2000" b="1" dirty="0">
-                <a:solidFill>
-                  <a:schemeClr val="accent1">
-                    <a:lumMod val="60000"/>
-                    <a:lumOff val="40000"/>
-                  </a:schemeClr>
-                </a:solidFill>
-                <a:latin typeface="Calibri" panose="020F0502020204030204" pitchFamily="34" charset="0"/>
-                <a:cs typeface="Calibri" panose="020F0502020204030204" pitchFamily="34" charset="0"/>
-              </a:rPr>
-              <a:t>градовете</a:t>
-            </a:r>
-            <a:endParaRPr lang="en-BG" sz="2000" b="1" dirty="0">
-              <a:solidFill>
-                <a:schemeClr val="accent1">
-                  <a:lumMod val="60000"/>
-                  <a:lumOff val="40000"/>
-                </a:schemeClr>
-              </a:solidFill>
-              <a:effectLst>
-                <a:outerShdw blurRad="38100" dist="38100" dir="2700000" algn="tl">
-                  <a:srgbClr val="000000">
-                    <a:alpha val="43137"/>
-                  </a:srgbClr>
-                </a:outerShdw>
-              </a:effectLst>
-              <a:latin typeface="Calibri" panose="020F0502020204030204" pitchFamily="34" charset="0"/>
-              <a:cs typeface="Calibri" panose="020F0502020204030204" pitchFamily="34" charset="0"/>
-            </a:endParaRPr>
-          </a:p>
-        </p:txBody>
-      </p:sp>
     </p:spTree>
     <p:extLst>
       <p:ext uri="{BB962C8B-B14F-4D97-AF65-F5344CB8AC3E}">
@@ -11133,172 +10878,9 @@
   <p:timing>
     <p:tnLst>
       <p:par>
-        <p:cTn id="1" dur="indefinite" restart="never" nodeType="tmRoot">
-          <p:childTnLst>
-            <p:seq concurrent="1" nextAc="seek">
-              <p:cTn id="2" dur="indefinite" nodeType="mainSeq">
-                <p:childTnLst>
-                  <p:par>
-                    <p:cTn id="3" fill="hold">
-                      <p:stCondLst>
-                        <p:cond delay="indefinite"/>
-                      </p:stCondLst>
-                      <p:childTnLst>
-                        <p:par>
-                          <p:cTn id="4" fill="hold">
-                            <p:stCondLst>
-                              <p:cond delay="0"/>
-                            </p:stCondLst>
-                            <p:childTnLst>
-                              <p:par>
-                                <p:cTn id="5" presetID="1" presetClass="entr" presetSubtype="0" fill="hold" grpId="0" nodeType="clickEffect">
-                                  <p:stCondLst>
-                                    <p:cond delay="0"/>
-                                  </p:stCondLst>
-                                  <p:childTnLst>
-                                    <p:set>
-                                      <p:cBhvr>
-                                        <p:cTn id="6" dur="1" fill="hold">
-                                          <p:stCondLst>
-                                            <p:cond delay="0"/>
-                                          </p:stCondLst>
-                                        </p:cTn>
-                                        <p:tgtEl>
-                                          <p:spTgt spid="3"/>
-                                        </p:tgtEl>
-                                        <p:attrNameLst>
-                                          <p:attrName>style.visibility</p:attrName>
-                                        </p:attrNameLst>
-                                      </p:cBhvr>
-                                      <p:to>
-                                        <p:strVal val="visible"/>
-                                      </p:to>
-                                    </p:set>
-                                  </p:childTnLst>
-                                </p:cTn>
-                              </p:par>
-                            </p:childTnLst>
-                          </p:cTn>
-                        </p:par>
-                      </p:childTnLst>
-                    </p:cTn>
-                  </p:par>
-                  <p:par>
-                    <p:cTn id="7" fill="hold">
-                      <p:stCondLst>
-                        <p:cond delay="indefinite"/>
-                      </p:stCondLst>
-                      <p:childTnLst>
-                        <p:par>
-                          <p:cTn id="8" fill="hold">
-                            <p:stCondLst>
-                              <p:cond delay="0"/>
-                            </p:stCondLst>
-                            <p:childTnLst>
-                              <p:par>
-                                <p:cTn id="9" presetID="1" presetClass="entr" presetSubtype="0" fill="hold" grpId="0" nodeType="clickEffect">
-                                  <p:stCondLst>
-                                    <p:cond delay="0"/>
-                                  </p:stCondLst>
-                                  <p:childTnLst>
-                                    <p:set>
-                                      <p:cBhvr>
-                                        <p:cTn id="10" dur="1" fill="hold">
-                                          <p:stCondLst>
-                                            <p:cond delay="0"/>
-                                          </p:stCondLst>
-                                        </p:cTn>
-                                        <p:tgtEl>
-                                          <p:spTgt spid="5"/>
-                                        </p:tgtEl>
-                                        <p:attrNameLst>
-                                          <p:attrName>style.visibility</p:attrName>
-                                        </p:attrNameLst>
-                                      </p:cBhvr>
-                                      <p:to>
-                                        <p:strVal val="visible"/>
-                                      </p:to>
-                                    </p:set>
-                                  </p:childTnLst>
-                                </p:cTn>
-                              </p:par>
-                            </p:childTnLst>
-                          </p:cTn>
-                        </p:par>
-                      </p:childTnLst>
-                    </p:cTn>
-                  </p:par>
-                  <p:par>
-                    <p:cTn id="11" fill="hold">
-                      <p:stCondLst>
-                        <p:cond delay="indefinite"/>
-                      </p:stCondLst>
-                      <p:childTnLst>
-                        <p:par>
-                          <p:cTn id="12" fill="hold">
-                            <p:stCondLst>
-                              <p:cond delay="0"/>
-                            </p:stCondLst>
-                            <p:childTnLst>
-                              <p:par>
-                                <p:cTn id="13" presetID="1" presetClass="entr" presetSubtype="0" fill="hold" grpId="0" nodeType="clickEffect">
-                                  <p:stCondLst>
-                                    <p:cond delay="0"/>
-                                  </p:stCondLst>
-                                  <p:childTnLst>
-                                    <p:set>
-                                      <p:cBhvr>
-                                        <p:cTn id="14" dur="1" fill="hold">
-                                          <p:stCondLst>
-                                            <p:cond delay="0"/>
-                                          </p:stCondLst>
-                                        </p:cTn>
-                                        <p:tgtEl>
-                                          <p:spTgt spid="7"/>
-                                        </p:tgtEl>
-                                        <p:attrNameLst>
-                                          <p:attrName>style.visibility</p:attrName>
-                                        </p:attrNameLst>
-                                      </p:cBhvr>
-                                      <p:to>
-                                        <p:strVal val="visible"/>
-                                      </p:to>
-                                    </p:set>
-                                  </p:childTnLst>
-                                </p:cTn>
-                              </p:par>
-                            </p:childTnLst>
-                          </p:cTn>
-                        </p:par>
-                      </p:childTnLst>
-                    </p:cTn>
-                  </p:par>
-                </p:childTnLst>
-              </p:cTn>
-              <p:prevCondLst>
-                <p:cond evt="onPrev" delay="0">
-                  <p:tgtEl>
-                    <p:sldTgt/>
-                  </p:tgtEl>
-                </p:cond>
-              </p:prevCondLst>
-              <p:nextCondLst>
-                <p:cond evt="onNext" delay="0">
-                  <p:tgtEl>
-                    <p:sldTgt/>
-                  </p:tgtEl>
-                </p:cond>
-              </p:nextCondLst>
-            </p:seq>
-          </p:childTnLst>
-        </p:cTn>
+        <p:cTn id="1" dur="indefinite" restart="never" nodeType="tmRoot"/>
       </p:par>
     </p:tnLst>
-    <p:bldLst>
-      <p:bldP spid="3" grpId="0" animBg="1"/>
-      <p:bldP spid="5" grpId="0" animBg="1"/>
-      <p:bldP spid="7" grpId="0" animBg="1"/>
-    </p:bldLst>
   </p:timing>
 </p:sld>
 </file>
@@ -11434,6 +11016,13 @@
       <p:transition spd="slow" advClick="0" advTm="5000"/>
     </mc:Fallback>
   </mc:AlternateContent>
+  <p:timing>
+    <p:tnLst>
+      <p:par>
+        <p:cTn id="1" dur="indefinite" restart="never" nodeType="tmRoot"/>
+      </p:par>
+    </p:tnLst>
+  </p:timing>
 </p:sld>
 </file>
 
@@ -22131,7 +21720,7 @@
                 <a:hlinkClick r:id="rId3">
                   <a:extLst>
                     <a:ext uri="{A12FA001-AC4F-418D-AE19-62706E023703}">
-                      <ahyp:hlinkClr xmlns:ahyp="http://schemas.microsoft.com/office/drawing/2018/hyperlinkcolor" val="tx"/>
+                      <ahyp:hlinkClr xmlns:ahyp="http://schemas.microsoft.com/office/drawing/2018/hyperlinkcolor" xmlns="" val="tx"/>
                     </a:ext>
                   </a:extLst>
                 </a:hlinkClick>

</xml_diff>